<commit_message>
FEAT: qr 코드 value 수정
</commit_message>
<xml_diff>
--- a/camera/qr_code/QR 프린트.pptx
+++ b/camera/qr_code/QR 프린트.pptx
@@ -107,6 +107,11 @@
       </a:defRPr>
     </a:lvl9pPr>
   </p:defaultTextStyle>
+  <p:extLst>
+    <p:ext uri="{EFAFB233-063F-42B5-8137-9DF3F51BA10A}">
+      <p15:sldGuideLst xmlns:p15="http://schemas.microsoft.com/office/powerpoint/2012/main"/>
+    </p:ext>
+  </p:extLst>
 </p:presentation>
 </file>
 
@@ -257,7 +262,7 @@
           <a:p>
             <a:fld id="{09D51075-C194-43EA-8A2D-88192AA8E442}" type="datetimeFigureOut">
               <a:rPr lang="ko-KR" altLang="en-US" smtClean="0"/>
-              <a:t>2024-11-18</a:t>
+              <a:t>2024-11-26</a:t>
             </a:fld>
             <a:endParaRPr lang="ko-KR" altLang="en-US"/>
           </a:p>
@@ -455,7 +460,7 @@
           <a:p>
             <a:fld id="{09D51075-C194-43EA-8A2D-88192AA8E442}" type="datetimeFigureOut">
               <a:rPr lang="ko-KR" altLang="en-US" smtClean="0"/>
-              <a:t>2024-11-18</a:t>
+              <a:t>2024-11-26</a:t>
             </a:fld>
             <a:endParaRPr lang="ko-KR" altLang="en-US"/>
           </a:p>
@@ -663,7 +668,7 @@
           <a:p>
             <a:fld id="{09D51075-C194-43EA-8A2D-88192AA8E442}" type="datetimeFigureOut">
               <a:rPr lang="ko-KR" altLang="en-US" smtClean="0"/>
-              <a:t>2024-11-18</a:t>
+              <a:t>2024-11-26</a:t>
             </a:fld>
             <a:endParaRPr lang="ko-KR" altLang="en-US"/>
           </a:p>
@@ -861,7 +866,7 @@
           <a:p>
             <a:fld id="{09D51075-C194-43EA-8A2D-88192AA8E442}" type="datetimeFigureOut">
               <a:rPr lang="ko-KR" altLang="en-US" smtClean="0"/>
-              <a:t>2024-11-18</a:t>
+              <a:t>2024-11-26</a:t>
             </a:fld>
             <a:endParaRPr lang="ko-KR" altLang="en-US"/>
           </a:p>
@@ -1136,7 +1141,7 @@
           <a:p>
             <a:fld id="{09D51075-C194-43EA-8A2D-88192AA8E442}" type="datetimeFigureOut">
               <a:rPr lang="ko-KR" altLang="en-US" smtClean="0"/>
-              <a:t>2024-11-18</a:t>
+              <a:t>2024-11-26</a:t>
             </a:fld>
             <a:endParaRPr lang="ko-KR" altLang="en-US"/>
           </a:p>
@@ -1401,7 +1406,7 @@
           <a:p>
             <a:fld id="{09D51075-C194-43EA-8A2D-88192AA8E442}" type="datetimeFigureOut">
               <a:rPr lang="ko-KR" altLang="en-US" smtClean="0"/>
-              <a:t>2024-11-18</a:t>
+              <a:t>2024-11-26</a:t>
             </a:fld>
             <a:endParaRPr lang="ko-KR" altLang="en-US"/>
           </a:p>
@@ -1813,7 +1818,7 @@
           <a:p>
             <a:fld id="{09D51075-C194-43EA-8A2D-88192AA8E442}" type="datetimeFigureOut">
               <a:rPr lang="ko-KR" altLang="en-US" smtClean="0"/>
-              <a:t>2024-11-18</a:t>
+              <a:t>2024-11-26</a:t>
             </a:fld>
             <a:endParaRPr lang="ko-KR" altLang="en-US"/>
           </a:p>
@@ -1954,7 +1959,7 @@
           <a:p>
             <a:fld id="{09D51075-C194-43EA-8A2D-88192AA8E442}" type="datetimeFigureOut">
               <a:rPr lang="ko-KR" altLang="en-US" smtClean="0"/>
-              <a:t>2024-11-18</a:t>
+              <a:t>2024-11-26</a:t>
             </a:fld>
             <a:endParaRPr lang="ko-KR" altLang="en-US"/>
           </a:p>
@@ -2067,7 +2072,7 @@
           <a:p>
             <a:fld id="{09D51075-C194-43EA-8A2D-88192AA8E442}" type="datetimeFigureOut">
               <a:rPr lang="ko-KR" altLang="en-US" smtClean="0"/>
-              <a:t>2024-11-18</a:t>
+              <a:t>2024-11-26</a:t>
             </a:fld>
             <a:endParaRPr lang="ko-KR" altLang="en-US"/>
           </a:p>
@@ -2378,7 +2383,7 @@
           <a:p>
             <a:fld id="{09D51075-C194-43EA-8A2D-88192AA8E442}" type="datetimeFigureOut">
               <a:rPr lang="ko-KR" altLang="en-US" smtClean="0"/>
-              <a:t>2024-11-18</a:t>
+              <a:t>2024-11-26</a:t>
             </a:fld>
             <a:endParaRPr lang="ko-KR" altLang="en-US"/>
           </a:p>
@@ -2666,7 +2671,7 @@
           <a:p>
             <a:fld id="{09D51075-C194-43EA-8A2D-88192AA8E442}" type="datetimeFigureOut">
               <a:rPr lang="ko-KR" altLang="en-US" smtClean="0"/>
-              <a:t>2024-11-18</a:t>
+              <a:t>2024-11-26</a:t>
             </a:fld>
             <a:endParaRPr lang="ko-KR" altLang="en-US"/>
           </a:p>
@@ -2907,7 +2912,7 @@
           <a:p>
             <a:fld id="{09D51075-C194-43EA-8A2D-88192AA8E442}" type="datetimeFigureOut">
               <a:rPr lang="ko-KR" altLang="en-US" smtClean="0"/>
-              <a:t>2024-11-18</a:t>
+              <a:t>2024-11-26</a:t>
             </a:fld>
             <a:endParaRPr lang="ko-KR" altLang="en-US"/>
           </a:p>
@@ -3324,42 +3329,6 @@
           <a:chExt cx="0" cy="0"/>
         </a:xfrm>
       </p:grpSpPr>
-      <p:pic>
-        <p:nvPicPr>
-          <p:cNvPr id="5" name="그림 4" descr="패턴, 사각형, 그래픽, 직사각형이(가) 표시된 사진&#10;&#10;자동 생성된 설명">
-            <a:extLst>
-              <a:ext uri="{FF2B5EF4-FFF2-40B4-BE49-F238E27FC236}">
-                <a16:creationId xmlns:a16="http://schemas.microsoft.com/office/drawing/2014/main" id="{B5ED6473-593A-D913-A4DB-50CC489FB299}"/>
-              </a:ext>
-            </a:extLst>
-          </p:cNvPr>
-          <p:cNvPicPr>
-            <a:picLocks noChangeAspect="1"/>
-          </p:cNvPicPr>
-          <p:nvPr/>
-        </p:nvPicPr>
-        <p:blipFill>
-          <a:blip r:embed="rId2">
-            <a:extLst>
-              <a:ext uri="{28A0092B-C50C-407E-A947-70E740481C1C}">
-                <a14:useLocalDpi xmlns:a14="http://schemas.microsoft.com/office/drawing/2010/main" val="0"/>
-              </a:ext>
-            </a:extLst>
-          </a:blip>
-          <a:stretch>
-            <a:fillRect/>
-          </a:stretch>
-        </p:blipFill>
-        <p:spPr>
-          <a:xfrm>
-            <a:off x="4714875" y="2047875"/>
-            <a:ext cx="2762250" cy="2762250"/>
-          </a:xfrm>
-          <a:prstGeom prst="rect">
-            <a:avLst/>
-          </a:prstGeom>
-        </p:spPr>
-      </p:pic>
       <p:sp>
         <p:nvSpPr>
           <p:cNvPr id="6" name="TextBox 5">
@@ -3395,6 +3364,42 @@
           </a:p>
         </p:txBody>
       </p:sp>
+      <p:pic>
+        <p:nvPicPr>
+          <p:cNvPr id="13" name="그림 12" descr="패턴, 사각형, 그래픽, 픽셀이(가) 표시된 사진&#10;&#10;자동 생성된 설명">
+            <a:extLst>
+              <a:ext uri="{FF2B5EF4-FFF2-40B4-BE49-F238E27FC236}">
+                <a16:creationId xmlns:a16="http://schemas.microsoft.com/office/drawing/2014/main" id="{66216A46-1CD9-F73E-AD9A-CCA7C993FAC9}"/>
+              </a:ext>
+            </a:extLst>
+          </p:cNvPr>
+          <p:cNvPicPr>
+            <a:picLocks noChangeAspect="1"/>
+          </p:cNvPicPr>
+          <p:nvPr/>
+        </p:nvPicPr>
+        <p:blipFill>
+          <a:blip r:embed="rId2">
+            <a:extLst>
+              <a:ext uri="{28A0092B-C50C-407E-A947-70E740481C1C}">
+                <a14:useLocalDpi xmlns:a14="http://schemas.microsoft.com/office/drawing/2010/main" val="0"/>
+              </a:ext>
+            </a:extLst>
+          </a:blip>
+          <a:stretch>
+            <a:fillRect/>
+          </a:stretch>
+        </p:blipFill>
+        <p:spPr>
+          <a:xfrm>
+            <a:off x="3437106" y="770106"/>
+            <a:ext cx="5317788" cy="5317788"/>
+          </a:xfrm>
+          <a:prstGeom prst="rect">
+            <a:avLst/>
+          </a:prstGeom>
+        </p:spPr>
+      </p:pic>
     </p:spTree>
     <p:extLst>
       <p:ext uri="{BB962C8B-B14F-4D97-AF65-F5344CB8AC3E}">
@@ -3456,10 +3461,10 @@
       </p:sp>
       <p:pic>
         <p:nvPicPr>
-          <p:cNvPr id="5" name="내용 개체 틀 4" descr="패턴, 사각형, 그래픽, 픽셀이(가) 표시된 사진&#10;&#10;자동 생성된 설명">
-            <a:extLst>
-              <a:ext uri="{FF2B5EF4-FFF2-40B4-BE49-F238E27FC236}">
-                <a16:creationId xmlns:a16="http://schemas.microsoft.com/office/drawing/2014/main" id="{754ED17F-9ADA-936D-D91B-B216F308ED7B}"/>
+          <p:cNvPr id="7" name="내용 개체 틀 6" descr="패턴, 사각형, 그래픽, 픽셀이(가) 표시된 사진&#10;&#10;자동 생성된 설명">
+            <a:extLst>
+              <a:ext uri="{FF2B5EF4-FFF2-40B4-BE49-F238E27FC236}">
+                <a16:creationId xmlns:a16="http://schemas.microsoft.com/office/drawing/2014/main" id="{8AAD11C9-DE60-BCF5-88BD-BF71908E0C5E}"/>
               </a:ext>
             </a:extLst>
           </p:cNvPr>
@@ -3484,8 +3489,8 @@
         </p:blipFill>
         <p:spPr>
           <a:xfrm>
-            <a:off x="4714875" y="2620169"/>
-            <a:ext cx="2762250" cy="2762250"/>
+            <a:off x="3228870" y="758615"/>
+            <a:ext cx="5734260" cy="5734260"/>
           </a:xfrm>
         </p:spPr>
       </p:pic>
@@ -3550,10 +3555,10 @@
       </p:sp>
       <p:pic>
         <p:nvPicPr>
-          <p:cNvPr id="5" name="내용 개체 틀 4" descr="패턴, 사각형, 그래픽, 대칭이(가) 표시된 사진&#10;&#10;자동 생성된 설명">
-            <a:extLst>
-              <a:ext uri="{FF2B5EF4-FFF2-40B4-BE49-F238E27FC236}">
-                <a16:creationId xmlns:a16="http://schemas.microsoft.com/office/drawing/2014/main" id="{3D46B133-60B4-956B-3A45-41131A69370B}"/>
+          <p:cNvPr id="7" name="내용 개체 틀 6" descr="패턴, 그래픽, 사각형, 픽셀이(가) 표시된 사진&#10;&#10;자동 생성된 설명">
+            <a:extLst>
+              <a:ext uri="{FF2B5EF4-FFF2-40B4-BE49-F238E27FC236}">
+                <a16:creationId xmlns:a16="http://schemas.microsoft.com/office/drawing/2014/main" id="{F1097BF4-000E-9E3B-7D61-D1D6B505A2B4}"/>
               </a:ext>
             </a:extLst>
           </p:cNvPr>
@@ -3578,8 +3583,8 @@
         </p:blipFill>
         <p:spPr>
           <a:xfrm>
-            <a:off x="4714875" y="2620169"/>
-            <a:ext cx="2762250" cy="2762250"/>
+            <a:off x="3118338" y="537551"/>
+            <a:ext cx="5955324" cy="5955324"/>
           </a:xfrm>
         </p:spPr>
       </p:pic>
@@ -3613,41 +3618,6 @@
           <a:chExt cx="0" cy="0"/>
         </a:xfrm>
       </p:grpSpPr>
-      <p:pic>
-        <p:nvPicPr>
-          <p:cNvPr id="5" name="내용 개체 틀 4" descr="패턴, 사각형, 그래픽, 예술이(가) 표시된 사진&#10;&#10;자동 생성된 설명">
-            <a:extLst>
-              <a:ext uri="{FF2B5EF4-FFF2-40B4-BE49-F238E27FC236}">
-                <a16:creationId xmlns:a16="http://schemas.microsoft.com/office/drawing/2014/main" id="{F2F77C15-51FE-B4E5-B3A8-FB165F45C4D5}"/>
-              </a:ext>
-            </a:extLst>
-          </p:cNvPr>
-          <p:cNvPicPr>
-            <a:picLocks noGrp="1" noChangeAspect="1"/>
-          </p:cNvPicPr>
-          <p:nvPr>
-            <p:ph idx="1"/>
-          </p:nvPr>
-        </p:nvPicPr>
-        <p:blipFill>
-          <a:blip r:embed="rId2">
-            <a:extLst>
-              <a:ext uri="{28A0092B-C50C-407E-A947-70E740481C1C}">
-                <a14:useLocalDpi xmlns:a14="http://schemas.microsoft.com/office/drawing/2010/main" val="0"/>
-              </a:ext>
-            </a:extLst>
-          </a:blip>
-          <a:stretch>
-            <a:fillRect/>
-          </a:stretch>
-        </p:blipFill>
-        <p:spPr>
-          <a:xfrm>
-            <a:off x="4714875" y="2620169"/>
-            <a:ext cx="2762250" cy="2762250"/>
-          </a:xfrm>
-        </p:spPr>
-      </p:pic>
       <p:sp>
         <p:nvSpPr>
           <p:cNvPr id="6" name="TextBox 5">
@@ -3684,6 +3654,41 @@
           </a:p>
         </p:txBody>
       </p:sp>
+      <p:pic>
+        <p:nvPicPr>
+          <p:cNvPr id="7" name="내용 개체 틀 6" descr="패턴, 사각형, 그래픽, 픽셀이(가) 표시된 사진&#10;&#10;자동 생성된 설명">
+            <a:extLst>
+              <a:ext uri="{FF2B5EF4-FFF2-40B4-BE49-F238E27FC236}">
+                <a16:creationId xmlns:a16="http://schemas.microsoft.com/office/drawing/2014/main" id="{15FCEA22-02C1-B186-E0F5-0CAF396C9398}"/>
+              </a:ext>
+            </a:extLst>
+          </p:cNvPr>
+          <p:cNvPicPr>
+            <a:picLocks noGrp="1" noChangeAspect="1"/>
+          </p:cNvPicPr>
+          <p:nvPr>
+            <p:ph idx="1"/>
+          </p:nvPr>
+        </p:nvPicPr>
+        <p:blipFill>
+          <a:blip r:embed="rId2">
+            <a:extLst>
+              <a:ext uri="{28A0092B-C50C-407E-A947-70E740481C1C}">
+                <a14:useLocalDpi xmlns:a14="http://schemas.microsoft.com/office/drawing/2010/main" val="0"/>
+              </a:ext>
+            </a:extLst>
+          </a:blip>
+          <a:stretch>
+            <a:fillRect/>
+          </a:stretch>
+        </p:blipFill>
+        <p:spPr>
+          <a:xfrm>
+            <a:off x="2987710" y="320710"/>
+            <a:ext cx="6216580" cy="6216580"/>
+          </a:xfrm>
+        </p:spPr>
+      </p:pic>
     </p:spTree>
     <p:extLst>
       <p:ext uri="{BB962C8B-B14F-4D97-AF65-F5344CB8AC3E}">

</xml_diff>